<commit_message>
edit ppt + edit taille chart + edit backgroud sur le css local (à push asap)
</commit_message>
<xml_diff>
--- a/Présentation1.pptx
+++ b/Présentation1.pptx
@@ -279,7 +279,7 @@
           <a:p>
             <a:fld id="{6A4B53A7-3209-46A6-9454-F38EAC8F11E7}" type="datetimeFigureOut">
               <a:rPr lang="en-US" smtClean="0"/>
-              <a:t>1/6/2022</a:t>
+              <a:t>1/29/2022</a:t>
             </a:fld>
             <a:endParaRPr lang="en-US"/>
           </a:p>
@@ -531,7 +531,7 @@
           <a:p>
             <a:fld id="{6A4B53A7-3209-46A6-9454-F38EAC8F11E7}" type="datetimeFigureOut">
               <a:rPr lang="en-US" smtClean="0"/>
-              <a:t>1/6/2022</a:t>
+              <a:t>1/29/2022</a:t>
             </a:fld>
             <a:endParaRPr lang="en-US"/>
           </a:p>
@@ -793,7 +793,7 @@
           <a:p>
             <a:fld id="{6A4B53A7-3209-46A6-9454-F38EAC8F11E7}" type="datetimeFigureOut">
               <a:rPr lang="en-US" smtClean="0"/>
-              <a:t>1/6/2022</a:t>
+              <a:t>1/29/2022</a:t>
             </a:fld>
             <a:endParaRPr lang="en-US"/>
           </a:p>
@@ -1045,7 +1045,7 @@
           <a:p>
             <a:fld id="{6A4B53A7-3209-46A6-9454-F38EAC8F11E7}" type="datetimeFigureOut">
               <a:rPr lang="en-US" smtClean="0"/>
-              <a:t>1/6/2022</a:t>
+              <a:t>1/29/2022</a:t>
             </a:fld>
             <a:endParaRPr lang="en-US"/>
           </a:p>
@@ -1374,7 +1374,7 @@
           <a:p>
             <a:fld id="{6A4B53A7-3209-46A6-9454-F38EAC8F11E7}" type="datetimeFigureOut">
               <a:rPr lang="en-US" smtClean="0"/>
-              <a:t>1/6/2022</a:t>
+              <a:t>1/29/2022</a:t>
             </a:fld>
             <a:endParaRPr lang="en-US"/>
           </a:p>
@@ -1693,7 +1693,7 @@
           <a:p>
             <a:fld id="{6A4B53A7-3209-46A6-9454-F38EAC8F11E7}" type="datetimeFigureOut">
               <a:rPr lang="en-US" smtClean="0"/>
-              <a:t>1/6/2022</a:t>
+              <a:t>1/29/2022</a:t>
             </a:fld>
             <a:endParaRPr lang="en-US"/>
           </a:p>
@@ -2159,7 +2159,7 @@
           <a:p>
             <a:fld id="{6A4B53A7-3209-46A6-9454-F38EAC8F11E7}" type="datetimeFigureOut">
               <a:rPr lang="en-US" smtClean="0"/>
-              <a:t>1/6/2022</a:t>
+              <a:t>1/29/2022</a:t>
             </a:fld>
             <a:endParaRPr lang="en-US"/>
           </a:p>
@@ -2354,7 +2354,7 @@
           <a:p>
             <a:fld id="{6A4B53A7-3209-46A6-9454-F38EAC8F11E7}" type="datetimeFigureOut">
               <a:rPr lang="en-US" smtClean="0"/>
-              <a:t>1/6/2022</a:t>
+              <a:t>1/29/2022</a:t>
             </a:fld>
             <a:endParaRPr lang="en-US"/>
           </a:p>
@@ -2521,7 +2521,7 @@
           <a:p>
             <a:fld id="{6A4B53A7-3209-46A6-9454-F38EAC8F11E7}" type="datetimeFigureOut">
               <a:rPr lang="en-US" smtClean="0"/>
-              <a:t>1/6/2022</a:t>
+              <a:t>1/29/2022</a:t>
             </a:fld>
             <a:endParaRPr lang="en-US"/>
           </a:p>
@@ -2886,7 +2886,7 @@
           <a:p>
             <a:fld id="{6A4B53A7-3209-46A6-9454-F38EAC8F11E7}" type="datetimeFigureOut">
               <a:rPr lang="en-US" smtClean="0"/>
-              <a:t>1/6/2022</a:t>
+              <a:t>1/29/2022</a:t>
             </a:fld>
             <a:endParaRPr lang="en-US"/>
           </a:p>
@@ -3231,7 +3231,7 @@
           <a:p>
             <a:fld id="{6A4B53A7-3209-46A6-9454-F38EAC8F11E7}" type="datetimeFigureOut">
               <a:rPr lang="en-US" smtClean="0"/>
-              <a:t>1/6/2022</a:t>
+              <a:t>1/29/2022</a:t>
             </a:fld>
             <a:endParaRPr lang="en-US"/>
           </a:p>
@@ -3527,7 +3527,7 @@
             <a:fld id="{6A4B53A7-3209-46A6-9454-F38EAC8F11E7}" type="datetimeFigureOut">
               <a:rPr lang="en-US" smtClean="0"/>
               <a:pPr/>
-              <a:t>1/6/2022</a:t>
+              <a:t>1/29/2022</a:t>
             </a:fld>
             <a:endParaRPr lang="en-US" dirty="0"/>
           </a:p>
@@ -9887,8 +9887,114 @@
           <a:p>
             <a:r>
               <a:rPr lang="fr-FR" sz="1800" dirty="0"/>
-              <a:t>Bootstrap</a:t>
-            </a:r>
+              <a:t>Utilisation d’outil simple et compréhensible</a:t>
+            </a:r>
+          </a:p>
+          <a:p>
+            <a:pPr lvl="1"/>
+            <a:r>
+              <a:rPr lang="fr-FR" sz="1400" dirty="0"/>
+              <a:t>Bootstrap sur la base d’un </a:t>
+            </a:r>
+            <a:r>
+              <a:rPr lang="fr-FR" sz="1400" dirty="0" err="1"/>
+              <a:t>template</a:t>
+            </a:r>
+            <a:r>
+              <a:rPr lang="fr-FR" sz="1400" dirty="0"/>
+              <a:t> </a:t>
+            </a:r>
+            <a:r>
+              <a:rPr lang="fr-FR" sz="1400" dirty="0">
+                <a:sym typeface="Wingdings" panose="05000000000000000000" pitchFamily="2" charset="2"/>
+              </a:rPr>
+              <a:t> SB Admin 2 </a:t>
+            </a:r>
+          </a:p>
+          <a:p>
+            <a:pPr lvl="1"/>
+            <a:r>
+              <a:rPr lang="fr-FR" sz="1400" dirty="0" err="1">
+                <a:sym typeface="Wingdings" panose="05000000000000000000" pitchFamily="2" charset="2"/>
+              </a:rPr>
+              <a:t>ChartJS</a:t>
+            </a:r>
+            <a:r>
+              <a:rPr lang="fr-FR" sz="1400" dirty="0">
+                <a:sym typeface="Wingdings" panose="05000000000000000000" pitchFamily="2" charset="2"/>
+              </a:rPr>
+              <a:t> pour l’affichage des graphiques</a:t>
+            </a:r>
+          </a:p>
+          <a:p>
+            <a:pPr lvl="1"/>
+            <a:r>
+              <a:rPr lang="fr-FR" sz="1400" dirty="0">
+                <a:sym typeface="Wingdings" panose="05000000000000000000" pitchFamily="2" charset="2"/>
+              </a:rPr>
+              <a:t>Mélange HTML/Javascript pour l’affichage et PHP pour l’exploitation des données via JSON</a:t>
+            </a:r>
+          </a:p>
+          <a:p>
+            <a:r>
+              <a:rPr lang="fr-FR" sz="1800" dirty="0">
+                <a:sym typeface="Wingdings" panose="05000000000000000000" pitchFamily="2" charset="2"/>
+              </a:rPr>
+              <a:t>Possibilité d’évolution anticipée</a:t>
+            </a:r>
+          </a:p>
+          <a:p>
+            <a:pPr lvl="1"/>
+            <a:r>
+              <a:rPr lang="fr-FR" sz="1400" dirty="0">
+                <a:sym typeface="Wingdings" panose="05000000000000000000" pitchFamily="2" charset="2"/>
+              </a:rPr>
+              <a:t>Séparation des taches (affichage/graphique/data)</a:t>
+            </a:r>
+          </a:p>
+          <a:p>
+            <a:pPr lvl="1"/>
+            <a:r>
+              <a:rPr lang="fr-FR" sz="1400" dirty="0">
+                <a:sym typeface="Wingdings" panose="05000000000000000000" pitchFamily="2" charset="2"/>
+              </a:rPr>
+              <a:t>Les requêtes en base sont modulables facilement</a:t>
+            </a:r>
+          </a:p>
+          <a:p>
+            <a:r>
+              <a:rPr lang="fr-FR" sz="1800" dirty="0">
+                <a:sym typeface="Wingdings" panose="05000000000000000000" pitchFamily="2" charset="2"/>
+              </a:rPr>
+              <a:t>Idées d’amélioration</a:t>
+            </a:r>
+            <a:endParaRPr lang="fr-FR" sz="1400" dirty="0">
+              <a:sym typeface="Wingdings" panose="05000000000000000000" pitchFamily="2" charset="2"/>
+            </a:endParaRPr>
+          </a:p>
+          <a:p>
+            <a:pPr lvl="1"/>
+            <a:r>
+              <a:rPr lang="fr-FR" sz="1400" dirty="0">
+                <a:sym typeface="Wingdings" panose="05000000000000000000" pitchFamily="2" charset="2"/>
+              </a:rPr>
+              <a:t>Sécurisation globale</a:t>
+            </a:r>
+          </a:p>
+          <a:p>
+            <a:pPr lvl="1"/>
+            <a:r>
+              <a:rPr lang="fr-FR" sz="1400" dirty="0">
+                <a:sym typeface="Wingdings" panose="05000000000000000000" pitchFamily="2" charset="2"/>
+              </a:rPr>
+              <a:t>Personnalisation</a:t>
+            </a:r>
+          </a:p>
+          <a:p>
+            <a:pPr lvl="1"/>
+            <a:endParaRPr lang="fr-FR" sz="1400" dirty="0">
+              <a:sym typeface="Wingdings" panose="05000000000000000000" pitchFamily="2" charset="2"/>
+            </a:endParaRPr>
           </a:p>
         </p:txBody>
       </p:sp>

</xml_diff>